<commit_message>
Update 07 - Chapter 7 - Error Handling.pptx
</commit_message>
<xml_diff>
--- a/slides/07 - Chapter 7 - Error Handling.pptx
+++ b/slides/07 - Chapter 7 - Error Handling.pptx
@@ -228,7 +228,7 @@
           <a:p>
             <a:fld id="{FA3BAC58-2994-4520-AF2C-D43020CE8323}" type="datetimeFigureOut">
               <a:rPr lang="en-US" smtClean="0"/>
-              <a:t>2/13/2021</a:t>
+              <a:t>4/10/2021</a:t>
             </a:fld>
             <a:endParaRPr lang="en-US"/>
           </a:p>
@@ -292,38 +292,37 @@
           <a:p>
             <a:pPr lvl="0"/>
             <a:r>
-              <a:rPr lang="en-US" smtClean="0"/>
+              <a:rPr lang="en-US"/>
               <a:t>Edit Master text styles</a:t>
             </a:r>
           </a:p>
           <a:p>
             <a:pPr lvl="1"/>
             <a:r>
-              <a:rPr lang="en-US" smtClean="0"/>
+              <a:rPr lang="en-US"/>
               <a:t>Second level</a:t>
             </a:r>
           </a:p>
           <a:p>
             <a:pPr lvl="2"/>
             <a:r>
-              <a:rPr lang="en-US" smtClean="0"/>
+              <a:rPr lang="en-US"/>
               <a:t>Third level</a:t>
             </a:r>
           </a:p>
           <a:p>
             <a:pPr lvl="3"/>
             <a:r>
-              <a:rPr lang="en-US" smtClean="0"/>
+              <a:rPr lang="en-US"/>
               <a:t>Fourth level</a:t>
             </a:r>
           </a:p>
           <a:p>
             <a:pPr lvl="4"/>
             <a:r>
-              <a:rPr lang="en-US" smtClean="0"/>
+              <a:rPr lang="en-US"/>
               <a:t>Fifth level</a:t>
             </a:r>
-            <a:endParaRPr lang="en-US"/>
           </a:p>
         </p:txBody>
       </p:sp>
@@ -543,7 +542,43 @@
             <a:pPr marL="0" indent="0" rtl="0" fontAlgn="ctr">
               <a:buNone/>
             </a:pPr>
-            <a:endParaRPr lang="x-none" sz="1200" kern="1200" dirty="0" smtClean="0">
+            <a:r>
+              <a:rPr lang="en-US" sz="1200" kern="1200" dirty="0">
+                <a:solidFill>
+                  <a:schemeClr val="tx1"/>
+                </a:solidFill>
+                <a:effectLst/>
+                <a:latin typeface="+mn-lt"/>
+                <a:ea typeface="+mn-ea"/>
+                <a:cs typeface="+mn-cs"/>
+              </a:rPr>
+              <a:t>Examples: </a:t>
+            </a:r>
+            <a:r>
+              <a:rPr lang="en-US" sz="1200" kern="1200" dirty="0" err="1">
+                <a:solidFill>
+                  <a:schemeClr val="tx1"/>
+                </a:solidFill>
+                <a:effectLst/>
+                <a:latin typeface="+mn-lt"/>
+                <a:ea typeface="+mn-ea"/>
+                <a:cs typeface="+mn-cs"/>
+              </a:rPr>
+              <a:t>IoException</a:t>
+            </a:r>
+            <a:r>
+              <a:rPr lang="en-US" sz="1200" kern="1200" dirty="0">
+                <a:solidFill>
+                  <a:schemeClr val="tx1"/>
+                </a:solidFill>
+                <a:effectLst/>
+                <a:latin typeface="+mn-lt"/>
+                <a:ea typeface="+mn-ea"/>
+                <a:cs typeface="+mn-cs"/>
+              </a:rPr>
+              <a:t>, 404 not found, Validation errors</a:t>
+            </a:r>
+            <a:endParaRPr lang="x-none" sz="1200" kern="1200" dirty="0">
               <a:solidFill>
                 <a:schemeClr val="tx1"/>
               </a:solidFill>
@@ -638,7 +673,7 @@
             <a:pPr marL="0" indent="0" rtl="0" fontAlgn="ctr">
               <a:buNone/>
             </a:pPr>
-            <a:endParaRPr lang="x-none" sz="1200" kern="1200" dirty="0" smtClean="0">
+            <a:endParaRPr lang="x-none" sz="1200" kern="1200" dirty="0">
               <a:solidFill>
                 <a:schemeClr val="tx1"/>
               </a:solidFill>
@@ -733,7 +768,7 @@
             <a:pPr marL="0" indent="0" rtl="0" fontAlgn="ctr">
               <a:buNone/>
             </a:pPr>
-            <a:endParaRPr lang="x-none" sz="1200" kern="1200" dirty="0" smtClean="0">
+            <a:endParaRPr lang="x-none" sz="1200" kern="1200" dirty="0">
               <a:solidFill>
                 <a:schemeClr val="tx1"/>
               </a:solidFill>
@@ -828,7 +863,7 @@
             <a:pPr marL="0" indent="0" rtl="0" fontAlgn="ctr">
               <a:buNone/>
             </a:pPr>
-            <a:endParaRPr lang="x-none" sz="1200" kern="1200" dirty="0" smtClean="0">
+            <a:endParaRPr lang="x-none" sz="1200" kern="1200" dirty="0">
               <a:solidFill>
                 <a:schemeClr val="tx1"/>
               </a:solidFill>
@@ -924,7 +959,7 @@
               <a:buNone/>
             </a:pPr>
             <a:r>
-              <a:rPr lang="en-US" sz="1200" b="0" i="0" u="none" strike="noStrike" kern="1200" baseline="0" dirty="0" smtClean="0">
+              <a:rPr lang="en-US" sz="1200" b="0" i="0" u="none" strike="noStrike" kern="1200" baseline="0" dirty="0">
                 <a:solidFill>
                   <a:schemeClr val="tx1"/>
                 </a:solidFill>
@@ -940,7 +975,7 @@
               <a:buNone/>
             </a:pPr>
             <a:r>
-              <a:rPr lang="en-US" sz="1200" kern="1200" dirty="0" smtClean="0">
+              <a:rPr lang="en-US" sz="1200" kern="1200" dirty="0">
                 <a:solidFill>
                   <a:schemeClr val="tx1"/>
                 </a:solidFill>
@@ -952,7 +987,7 @@
               <a:t>You create a class or configure an</a:t>
             </a:r>
             <a:r>
-              <a:rPr lang="en-US" sz="1200" kern="1200" baseline="0" dirty="0" smtClean="0">
+              <a:rPr lang="en-US" sz="1200" kern="1200" baseline="0" dirty="0">
                 <a:solidFill>
                   <a:schemeClr val="tx1"/>
                 </a:solidFill>
@@ -964,7 +999,7 @@
               <a:t> </a:t>
             </a:r>
             <a:r>
-              <a:rPr lang="en-US" sz="1200" kern="1200" dirty="0" smtClean="0">
+              <a:rPr lang="en-US" sz="1200" kern="1200" dirty="0">
                 <a:solidFill>
                   <a:schemeClr val="tx1"/>
                 </a:solidFill>
@@ -981,7 +1016,7 @@
               <a:buNone/>
             </a:pPr>
             <a:r>
-              <a:rPr lang="en-US" sz="1200" kern="1200" dirty="0" smtClean="0">
+              <a:rPr lang="en-US" sz="1200" kern="1200" dirty="0">
                 <a:solidFill>
                   <a:schemeClr val="tx1"/>
                 </a:solidFill>
@@ -992,7 +1027,7 @@
               </a:rPr>
               <a:t>to deal with exceptional behavior. That behavior is encapsulated in the special case object</a:t>
             </a:r>
-            <a:endParaRPr lang="x-none" sz="1200" kern="1200" dirty="0" smtClean="0">
+            <a:endParaRPr lang="x-none" sz="1200" kern="1200" dirty="0">
               <a:solidFill>
                 <a:schemeClr val="tx1"/>
               </a:solidFill>
@@ -1088,7 +1123,7 @@
               <a:buNone/>
             </a:pPr>
             <a:r>
-              <a:rPr lang="en-US" sz="1200" kern="1200" dirty="0" smtClean="0">
+              <a:rPr lang="en-US" sz="1200" kern="1200" dirty="0">
                 <a:solidFill>
                   <a:schemeClr val="tx1"/>
                 </a:solidFill>
@@ -1100,7 +1135,7 @@
               <a:t>What if</a:t>
             </a:r>
             <a:r>
-              <a:rPr lang="en-US" sz="1200" kern="1200" baseline="0" dirty="0" smtClean="0">
+              <a:rPr lang="en-US" sz="1200" kern="1200" baseline="0" dirty="0">
                 <a:solidFill>
                   <a:schemeClr val="tx1"/>
                 </a:solidFill>
@@ -1112,7 +1147,7 @@
               <a:t> </a:t>
             </a:r>
             <a:r>
-              <a:rPr lang="en-US" sz="1200" kern="1200" baseline="0" dirty="0" err="1" smtClean="0">
+              <a:rPr lang="en-US" sz="1200" kern="1200" baseline="0" dirty="0" err="1">
                 <a:solidFill>
                   <a:schemeClr val="tx1"/>
                 </a:solidFill>
@@ -1124,7 +1159,7 @@
               <a:t>persistenStore</a:t>
             </a:r>
             <a:r>
-              <a:rPr lang="en-US" sz="1200" kern="1200" baseline="0" dirty="0" smtClean="0">
+              <a:rPr lang="en-US" sz="1200" kern="1200" baseline="0" dirty="0">
                 <a:solidFill>
                   <a:schemeClr val="tx1"/>
                 </a:solidFill>
@@ -1135,7 +1170,7 @@
               </a:rPr>
               <a:t> is null ?!</a:t>
             </a:r>
-            <a:endParaRPr lang="x-none" sz="1200" kern="1200" dirty="0" smtClean="0">
+            <a:endParaRPr lang="x-none" sz="1200" kern="1200" dirty="0">
               <a:solidFill>
                 <a:schemeClr val="tx1"/>
               </a:solidFill>
@@ -1230,7 +1265,7 @@
             <a:pPr marL="0" indent="0" rtl="0" fontAlgn="ctr">
               <a:buNone/>
             </a:pPr>
-            <a:endParaRPr lang="x-none" sz="1200" kern="1200" dirty="0" smtClean="0">
+            <a:endParaRPr lang="x-none" sz="1200" kern="1200" dirty="0">
               <a:solidFill>
                 <a:schemeClr val="tx1"/>
               </a:solidFill>
@@ -1326,7 +1361,7 @@
               <a:buNone/>
             </a:pPr>
             <a:r>
-              <a:rPr lang="en-US" sz="1200" b="0" i="0" u="none" strike="noStrike" kern="1200" baseline="0" dirty="0" smtClean="0">
+              <a:rPr lang="en-US" sz="1200" b="0" i="0" u="none" strike="noStrike" kern="1200" baseline="0" dirty="0">
                 <a:solidFill>
                   <a:schemeClr val="tx1"/>
                 </a:solidFill>
@@ -1336,7 +1371,7 @@
               </a:rPr>
               <a:t>Returning null from methods is bad, but passing null into methods is worse</a:t>
             </a:r>
-            <a:endParaRPr lang="x-none" sz="1200" kern="1200" dirty="0" smtClean="0">
+            <a:endParaRPr lang="x-none" sz="1200" kern="1200" dirty="0">
               <a:solidFill>
                 <a:schemeClr val="tx1"/>
               </a:solidFill>
@@ -1431,19 +1466,7 @@
             <a:pPr marL="0" indent="0" rtl="0" fontAlgn="ctr">
               <a:buNone/>
             </a:pPr>
-            <a:r>
-              <a:rPr lang="en-US" sz="1200" kern="1200" dirty="0" smtClean="0">
-                <a:solidFill>
-                  <a:schemeClr val="tx1"/>
-                </a:solidFill>
-                <a:effectLst/>
-                <a:latin typeface="+mn-lt"/>
-                <a:ea typeface="+mn-ea"/>
-                <a:cs typeface="+mn-cs"/>
-              </a:rPr>
-              <a:t>Kotlin is awesome</a:t>
-            </a:r>
-            <a:endParaRPr lang="x-none" sz="1200" kern="1200" dirty="0" smtClean="0">
+            <a:endParaRPr lang="x-none" sz="1200" kern="1200" dirty="0">
               <a:solidFill>
                 <a:schemeClr val="tx1"/>
               </a:solidFill>
@@ -1538,7 +1561,7 @@
             <a:pPr marL="0" indent="0" rtl="0" fontAlgn="ctr">
               <a:buNone/>
             </a:pPr>
-            <a:endParaRPr lang="x-none" sz="1200" kern="1200" dirty="0" smtClean="0">
+            <a:endParaRPr lang="x-none" sz="1200" kern="1200" dirty="0">
               <a:solidFill>
                 <a:schemeClr val="tx1"/>
               </a:solidFill>
@@ -1633,7 +1656,7 @@
             <a:pPr marL="0" indent="0" rtl="0" fontAlgn="ctr">
               <a:buNone/>
             </a:pPr>
-            <a:endParaRPr lang="x-none" sz="1200" kern="1200" dirty="0" smtClean="0">
+            <a:endParaRPr lang="x-none" sz="1200" kern="1200" dirty="0">
               <a:solidFill>
                 <a:schemeClr val="tx1"/>
               </a:solidFill>
@@ -1729,7 +1752,7 @@
               <a:buNone/>
             </a:pPr>
             <a:r>
-              <a:rPr lang="en-US" sz="1200" kern="1200" dirty="0" smtClean="0">
+              <a:rPr lang="en-US" sz="1200" kern="1200" dirty="0">
                 <a:solidFill>
                   <a:schemeClr val="tx1"/>
                 </a:solidFill>
@@ -1741,7 +1764,7 @@
               <a:t>Caller must</a:t>
             </a:r>
             <a:r>
-              <a:rPr lang="en-US" sz="1200" kern="1200" baseline="0" dirty="0" smtClean="0">
+              <a:rPr lang="en-US" sz="1200" kern="1200" baseline="0" dirty="0">
                 <a:solidFill>
                   <a:schemeClr val="tx1"/>
                 </a:solidFill>
@@ -1758,7 +1781,7 @@
               <a:buNone/>
             </a:pPr>
             <a:r>
-              <a:rPr lang="en-US" sz="1200" b="0" i="0" u="none" strike="noStrike" kern="1200" baseline="0" dirty="0" smtClean="0">
+              <a:rPr lang="en-US" sz="1200" b="0" i="0" u="none" strike="noStrike" kern="1200" baseline="0" dirty="0">
                 <a:solidFill>
                   <a:schemeClr val="tx1"/>
                 </a:solidFill>
@@ -1768,7 +1791,7 @@
               </a:rPr>
               <a:t>Unfortunately, it’s easy to forget</a:t>
             </a:r>
-            <a:endParaRPr lang="en-US" sz="1200" kern="1200" baseline="0" dirty="0" smtClean="0">
+            <a:endParaRPr lang="en-US" sz="1200" kern="1200" baseline="0" dirty="0">
               <a:solidFill>
                 <a:schemeClr val="tx1"/>
               </a:solidFill>
@@ -1864,7 +1887,7 @@
               <a:buNone/>
             </a:pPr>
             <a:r>
-              <a:rPr lang="en-US" sz="1200" kern="1200" baseline="0" dirty="0" smtClean="0">
+              <a:rPr lang="en-US" sz="1200" kern="1200" baseline="0" dirty="0">
                 <a:solidFill>
                   <a:schemeClr val="tx1"/>
                 </a:solidFill>
@@ -1962,7 +1985,7 @@
               <a:buNone/>
             </a:pPr>
             <a:r>
-              <a:rPr lang="en-US" sz="1200" kern="1200" baseline="0" dirty="0" smtClean="0">
+              <a:rPr lang="en-US" sz="1200" kern="1200" baseline="0" dirty="0">
                 <a:solidFill>
                   <a:schemeClr val="tx1"/>
                 </a:solidFill>
@@ -2060,7 +2083,7 @@
               <a:buNone/>
             </a:pPr>
             <a:r>
-              <a:rPr lang="en-US" sz="1200" kern="1200" dirty="0" smtClean="0">
+              <a:rPr lang="en-US" sz="1200" kern="1200" dirty="0">
                 <a:solidFill>
                   <a:schemeClr val="tx1"/>
                 </a:solidFill>
@@ -2072,7 +2095,7 @@
               <a:t>Now you can safely write your code after</a:t>
             </a:r>
             <a:r>
-              <a:rPr lang="en-US" sz="1200" kern="1200" baseline="0" dirty="0" smtClean="0">
+              <a:rPr lang="en-US" sz="1200" kern="1200" baseline="0" dirty="0">
                 <a:solidFill>
                   <a:schemeClr val="tx1"/>
                 </a:solidFill>
@@ -2083,7 +2106,7 @@
               </a:rPr>
               <a:t> stream is created</a:t>
             </a:r>
-            <a:endParaRPr lang="x-none" sz="1200" kern="1200" dirty="0" smtClean="0">
+            <a:endParaRPr lang="x-none" sz="1200" kern="1200" dirty="0">
               <a:solidFill>
                 <a:schemeClr val="tx1"/>
               </a:solidFill>
@@ -2179,7 +2202,7 @@
               <a:buNone/>
             </a:pPr>
             <a:r>
-              <a:rPr lang="en-US" sz="1200" kern="1200" dirty="0" smtClean="0">
+              <a:rPr lang="en-US" sz="1200" kern="1200" dirty="0">
                 <a:solidFill>
                   <a:schemeClr val="tx1"/>
                 </a:solidFill>
@@ -2196,7 +2219,7 @@
               <a:buNone/>
             </a:pPr>
             <a:r>
-              <a:rPr lang="en-US" sz="1200" kern="1200" dirty="0" smtClean="0">
+              <a:rPr lang="en-US" sz="1200" kern="1200" dirty="0">
                 <a:solidFill>
                   <a:schemeClr val="tx1"/>
                 </a:solidFill>
@@ -2208,7 +2231,7 @@
               <a:t>- Encapsulation is broken because all functions in the path</a:t>
             </a:r>
             <a:r>
-              <a:rPr lang="en-US" sz="1200" kern="1200" baseline="0" dirty="0" smtClean="0">
+              <a:rPr lang="en-US" sz="1200" kern="1200" baseline="0" dirty="0">
                 <a:solidFill>
                   <a:schemeClr val="tx1"/>
                 </a:solidFill>
@@ -2220,7 +2243,7 @@
               <a:t> </a:t>
             </a:r>
             <a:r>
-              <a:rPr lang="en-US" sz="1200" kern="1200" dirty="0" smtClean="0">
+              <a:rPr lang="en-US" sz="1200" kern="1200" dirty="0">
                 <a:solidFill>
                   <a:schemeClr val="tx1"/>
                 </a:solidFill>
@@ -2231,7 +2254,7 @@
               </a:rPr>
               <a:t>of a throw must know about details of that low-level exception.</a:t>
             </a:r>
-            <a:endParaRPr lang="x-none" sz="1200" kern="1200" dirty="0" smtClean="0">
+            <a:endParaRPr lang="x-none" sz="1200" kern="1200" dirty="0">
               <a:solidFill>
                 <a:schemeClr val="tx1"/>
               </a:solidFill>
@@ -2326,7 +2349,7 @@
             <a:pPr marL="0" indent="0" rtl="0" fontAlgn="ctr">
               <a:buNone/>
             </a:pPr>
-            <a:endParaRPr lang="x-none" sz="1200" kern="1200" dirty="0" smtClean="0">
+            <a:endParaRPr lang="x-none" sz="1200" kern="1200" dirty="0">
               <a:solidFill>
                 <a:schemeClr val="tx1"/>
               </a:solidFill>
@@ -2422,7 +2445,7 @@
               <a:buNone/>
             </a:pPr>
             <a:r>
-              <a:rPr lang="en-US" sz="1200" kern="1200" dirty="0" smtClean="0">
+              <a:rPr lang="en-US" sz="1200" kern="1200" dirty="0">
                 <a:solidFill>
                   <a:schemeClr val="tx1"/>
                 </a:solidFill>
@@ -2434,7 +2457,7 @@
               <a:t>Proper error (saber</a:t>
             </a:r>
             <a:r>
-              <a:rPr lang="en-US" sz="1200" kern="1200" baseline="0" dirty="0" smtClean="0">
+              <a:rPr lang="en-US" sz="1200" kern="1200" baseline="0" dirty="0">
                 <a:solidFill>
                   <a:schemeClr val="tx1"/>
                 </a:solidFill>
@@ -2445,7 +2468,7 @@
               </a:rPr>
               <a:t> fun)</a:t>
             </a:r>
-            <a:endParaRPr lang="x-none" sz="1200" kern="1200" dirty="0" smtClean="0">
+            <a:endParaRPr lang="x-none" sz="1200" kern="1200" dirty="0">
               <a:solidFill>
                 <a:schemeClr val="tx1"/>
               </a:solidFill>
@@ -2541,7 +2564,7 @@
               <a:buNone/>
             </a:pPr>
             <a:r>
-              <a:rPr lang="en-US" sz="1200" kern="1200" dirty="0" smtClean="0">
+              <a:rPr lang="en-US" sz="1200" kern="1200" dirty="0">
                 <a:solidFill>
                   <a:schemeClr val="tx1"/>
                 </a:solidFill>
@@ -2553,7 +2576,7 @@
               <a:t>Here is</a:t>
             </a:r>
             <a:r>
-              <a:rPr lang="en-US" sz="1200" kern="1200" baseline="0" dirty="0" smtClean="0">
+              <a:rPr lang="en-US" sz="1200" kern="1200" baseline="0" dirty="0">
                 <a:solidFill>
                   <a:schemeClr val="tx1"/>
                 </a:solidFill>
@@ -2565,7 +2588,7 @@
               <a:t> a third-party </a:t>
             </a:r>
             <a:r>
-              <a:rPr lang="en-US" sz="1200" kern="1200" baseline="0" dirty="0" err="1" smtClean="0">
+              <a:rPr lang="en-US" sz="1200" kern="1200" baseline="0" dirty="0" err="1">
                 <a:solidFill>
                   <a:schemeClr val="tx1"/>
                 </a:solidFill>
@@ -2577,7 +2600,7 @@
               <a:t>api</a:t>
             </a:r>
             <a:r>
-              <a:rPr lang="en-US" sz="1200" kern="1200" baseline="0" dirty="0" smtClean="0">
+              <a:rPr lang="en-US" sz="1200" kern="1200" baseline="0" dirty="0">
                 <a:solidFill>
                   <a:schemeClr val="tx1"/>
                 </a:solidFill>
@@ -2588,7 +2611,7 @@
               </a:rPr>
               <a:t> we are using all over our codebase</a:t>
             </a:r>
-            <a:endParaRPr lang="x-none" sz="1200" kern="1200" dirty="0" smtClean="0">
+            <a:endParaRPr lang="x-none" sz="1200" kern="1200" dirty="0">
               <a:solidFill>
                 <a:schemeClr val="tx1"/>
               </a:solidFill>
@@ -2775,7 +2798,7 @@
           <a:p>
             <a:fld id="{1D8BD707-D9CF-40AE-B4C6-C98DA3205C09}" type="datetimeFigureOut">
               <a:rPr lang="en-US"/>
-              <a:t>2/13/2021</a:t>
+              <a:t>4/10/2021</a:t>
             </a:fld>
             <a:endParaRPr lang="en-US"/>
           </a:p>
@@ -2950,7 +2973,7 @@
           <a:p>
             <a:fld id="{1D8BD707-D9CF-40AE-B4C6-C98DA3205C09}" type="datetimeFigureOut">
               <a:rPr lang="en-US"/>
-              <a:t>2/13/2021</a:t>
+              <a:t>4/10/2021</a:t>
             </a:fld>
             <a:endParaRPr lang="en-US"/>
           </a:p>
@@ -3164,7 +3187,7 @@
           <a:p>
             <a:fld id="{1D8BD707-D9CF-40AE-B4C6-C98DA3205C09}" type="datetimeFigureOut">
               <a:rPr lang="en-US"/>
-              <a:t>2/13/2021</a:t>
+              <a:t>4/10/2021</a:t>
             </a:fld>
             <a:endParaRPr lang="en-US"/>
           </a:p>
@@ -3312,7 +3335,7 @@
           <a:p>
             <a:fld id="{1D8BD707-D9CF-40AE-B4C6-C98DA3205C09}" type="datetimeFigureOut">
               <a:rPr lang="en-US"/>
-              <a:t>2/13/2021</a:t>
+              <a:t>4/10/2021</a:t>
             </a:fld>
             <a:endParaRPr lang="en-US"/>
           </a:p>
@@ -3431,7 +3454,7 @@
           <a:p>
             <a:fld id="{1D8BD707-D9CF-40AE-B4C6-C98DA3205C09}" type="datetimeFigureOut">
               <a:rPr lang="en-US"/>
-              <a:t>2/13/2021</a:t>
+              <a:t>4/10/2021</a:t>
             </a:fld>
             <a:endParaRPr lang="en-US"/>
           </a:p>
@@ -3733,7 +3756,7 @@
           <a:p>
             <a:fld id="{1D8BD707-D9CF-40AE-B4C6-C98DA3205C09}" type="datetimeFigureOut">
               <a:rPr lang="en-US"/>
-              <a:t>2/13/2021</a:t>
+              <a:t>4/10/2021</a:t>
             </a:fld>
             <a:endParaRPr lang="en-US"/>
           </a:p>
@@ -4012,21 +4035,17 @@
               </a:lnSpc>
             </a:pPr>
             <a:r>
-              <a:rPr lang="en-US" sz="6000" dirty="0" smtClean="0"/>
+              <a:rPr lang="en-US" sz="6000" dirty="0"/>
               <a:t>Chapter 7</a:t>
             </a:r>
             <a:br>
-              <a:rPr lang="en-US" sz="6000" dirty="0" smtClean="0"/>
+              <a:rPr lang="en-US" sz="6000" dirty="0"/>
             </a:br>
-            <a:r>
-              <a:rPr lang="en-US" spc="-10" dirty="0" smtClean="0"/>
-              <a:t/>
-            </a:r>
             <a:br>
-              <a:rPr lang="en-US" spc="-10" dirty="0" smtClean="0"/>
+              <a:rPr lang="en-US" spc="-10" dirty="0"/>
             </a:br>
             <a:r>
-              <a:rPr lang="en-US" spc="-10" dirty="0" smtClean="0"/>
+              <a:rPr lang="en-US" spc="-10" dirty="0"/>
               <a:t>Error Handling</a:t>
             </a:r>
             <a:endParaRPr spc="-5" dirty="0"/>
@@ -4043,13 +4062,6 @@
   <p:clrMapOvr>
     <a:masterClrMapping/>
   </p:clrMapOvr>
-  <p:timing>
-    <p:tnLst>
-      <p:par>
-        <p:cTn id="1" dur="indefinite" restart="never" nodeType="tmRoot"/>
-      </p:par>
-    </p:tnLst>
-  </p:timing>
 </p:sld>
 </file>
 
@@ -4108,7 +4120,6 @@
               <a:rPr lang="en-US" dirty="0"/>
               <a:t>Define Exception Classes in Terms of a Caller’s Needs</a:t>
             </a:r>
-            <a:endParaRPr lang="en-US" dirty="0" smtClean="0"/>
           </a:p>
         </p:txBody>
       </p:sp>
@@ -4146,13 +4157,6 @@
   <p:clrMapOvr>
     <a:masterClrMapping/>
   </p:clrMapOvr>
-  <p:timing>
-    <p:tnLst>
-      <p:par>
-        <p:cTn id="1" dur="indefinite" restart="never" nodeType="tmRoot"/>
-      </p:par>
-    </p:tnLst>
-  </p:timing>
 </p:sld>
 </file>
 
@@ -4211,7 +4215,6 @@
               <a:rPr lang="en-US" dirty="0"/>
               <a:t>Define Exception Classes in Terms of a Caller’s Needs</a:t>
             </a:r>
-            <a:endParaRPr lang="en-US" dirty="0" smtClean="0"/>
           </a:p>
         </p:txBody>
       </p:sp>
@@ -4249,13 +4252,6 @@
   <p:clrMapOvr>
     <a:masterClrMapping/>
   </p:clrMapOvr>
-  <p:timing>
-    <p:tnLst>
-      <p:par>
-        <p:cTn id="1" dur="indefinite" restart="never" nodeType="tmRoot"/>
-      </p:par>
-    </p:tnLst>
-  </p:timing>
 </p:sld>
 </file>
 
@@ -4314,7 +4310,6 @@
               <a:rPr lang="en-US" dirty="0"/>
               <a:t>Define Exception Classes in Terms of a Caller’s Needs</a:t>
             </a:r>
-            <a:endParaRPr lang="en-US" dirty="0" smtClean="0"/>
           </a:p>
         </p:txBody>
       </p:sp>
@@ -4358,13 +4353,6 @@
   <p:clrMapOvr>
     <a:masterClrMapping/>
   </p:clrMapOvr>
-  <p:timing>
-    <p:tnLst>
-      <p:par>
-        <p:cTn id="1" dur="indefinite" restart="never" nodeType="tmRoot"/>
-      </p:par>
-    </p:tnLst>
-  </p:timing>
 </p:sld>
 </file>
 
@@ -4415,7 +4403,7 @@
               </a:tabLst>
             </a:pPr>
             <a:r>
-              <a:rPr lang="en-US" sz="3200" dirty="0" smtClean="0">
+              <a:rPr lang="en-US" sz="3200" dirty="0">
                 <a:solidFill>
                   <a:srgbClr val="FFFFFF"/>
                 </a:solidFill>
@@ -4461,37 +4449,7 @@
                 <a:latin typeface="Century Gothic"/>
                 <a:cs typeface="Century Gothic"/>
               </a:rPr>
-              <a:t>minimize </a:t>
-            </a:r>
-            <a:r>
-              <a:rPr lang="en-US" sz="3200" dirty="0" smtClean="0">
-                <a:solidFill>
-                  <a:srgbClr val="FFFFFF"/>
-                </a:solidFill>
-                <a:latin typeface="Century Gothic"/>
-                <a:cs typeface="Century Gothic"/>
-              </a:rPr>
-              <a:t>your dependencies </a:t>
-            </a:r>
-            <a:r>
-              <a:rPr lang="en-US" sz="3200" dirty="0">
-                <a:solidFill>
-                  <a:srgbClr val="FFFFFF"/>
-                </a:solidFill>
-                <a:latin typeface="Century Gothic"/>
-                <a:cs typeface="Century Gothic"/>
-              </a:rPr>
-              <a:t>upon it: You can choose to move to a different library in the future </a:t>
-            </a:r>
-            <a:r>
-              <a:rPr lang="en-US" sz="3200" dirty="0" smtClean="0">
-                <a:solidFill>
-                  <a:srgbClr val="FFFFFF"/>
-                </a:solidFill>
-                <a:latin typeface="Century Gothic"/>
-                <a:cs typeface="Century Gothic"/>
-              </a:rPr>
-              <a:t>without much penalty</a:t>
+              <a:t>minimize your dependencies upon it: You can choose to move to a different library in the future without much penalty</a:t>
             </a:r>
           </a:p>
           <a:p>
@@ -4532,37 +4490,7 @@
                 <a:latin typeface="Century Gothic"/>
                 <a:cs typeface="Century Gothic"/>
               </a:rPr>
-              <a:t>makes it easier to mock out third-party calls when you </a:t>
-            </a:r>
-            <a:r>
-              <a:rPr lang="en-US" sz="3200" dirty="0" smtClean="0">
-                <a:solidFill>
-                  <a:srgbClr val="FFFFFF"/>
-                </a:solidFill>
-                <a:latin typeface="Century Gothic"/>
-                <a:cs typeface="Century Gothic"/>
-              </a:rPr>
-              <a:t>are testing </a:t>
-            </a:r>
-            <a:r>
-              <a:rPr lang="en-US" sz="3200" dirty="0">
-                <a:solidFill>
-                  <a:srgbClr val="FFFFFF"/>
-                </a:solidFill>
-                <a:latin typeface="Century Gothic"/>
-                <a:cs typeface="Century Gothic"/>
-              </a:rPr>
-              <a:t>your own code</a:t>
-            </a:r>
-            <a:r>
-              <a:rPr lang="en-US" sz="3200" dirty="0" smtClean="0">
-                <a:solidFill>
-                  <a:srgbClr val="FFFFFF"/>
-                </a:solidFill>
-                <a:latin typeface="Century Gothic"/>
-                <a:cs typeface="Century Gothic"/>
-              </a:rPr>
-              <a:t>.</a:t>
+              <a:t>makes it easier to mock out third-party calls when you are testing your own code.</a:t>
             </a:r>
           </a:p>
           <a:p>
@@ -4603,25 +4531,8 @@
                 <a:latin typeface="Century Gothic"/>
                 <a:cs typeface="Century Gothic"/>
               </a:rPr>
-              <a:t>You can define an API that you feel </a:t>
-            </a:r>
-            <a:r>
-              <a:rPr lang="en-US" sz="3200" dirty="0" smtClean="0">
-                <a:solidFill>
-                  <a:srgbClr val="FFFFFF"/>
-                </a:solidFill>
-                <a:latin typeface="Century Gothic"/>
-                <a:cs typeface="Century Gothic"/>
-              </a:rPr>
-              <a:t>comfortable with</a:t>
-            </a:r>
-            <a:endParaRPr lang="en-US" sz="3200" dirty="0">
-              <a:solidFill>
-                <a:srgbClr val="FFFFFF"/>
-              </a:solidFill>
-              <a:latin typeface="Century Gothic"/>
-              <a:cs typeface="Century Gothic"/>
-            </a:endParaRPr>
+              <a:t>You can define an API that you feel comfortable with</a:t>
+            </a:r>
           </a:p>
         </p:txBody>
       </p:sp>
@@ -4661,13 +4572,8 @@
           <a:p>
             <a:r>
               <a:rPr lang="en-US" dirty="0"/>
-              <a:t>Define Exception Classes in Terms of a Caller’s </a:t>
-            </a:r>
-            <a:r>
-              <a:rPr lang="en-US" dirty="0" smtClean="0"/>
-              <a:t>Needs</a:t>
-            </a:r>
-            <a:endParaRPr lang="en-US" dirty="0"/>
+              <a:t>Define Exception Classes in Terms of a Caller’s Needs</a:t>
+            </a:r>
           </a:p>
         </p:txBody>
       </p:sp>
@@ -4681,13 +4587,6 @@
   <p:clrMapOvr>
     <a:masterClrMapping/>
   </p:clrMapOvr>
-  <p:timing>
-    <p:tnLst>
-      <p:par>
-        <p:cTn id="1" dur="indefinite" restart="never" nodeType="tmRoot"/>
-      </p:par>
-    </p:tnLst>
-  </p:timing>
 </p:sld>
 </file>
 
@@ -4743,10 +4642,9 @@
           </a:lstStyle>
           <a:p>
             <a:r>
-              <a:rPr lang="en-US" dirty="0" smtClean="0"/>
+              <a:rPr lang="en-US" dirty="0"/>
               <a:t>Define the normal flow</a:t>
             </a:r>
-            <a:endParaRPr lang="en-US" dirty="0" smtClean="0"/>
           </a:p>
         </p:txBody>
       </p:sp>
@@ -4828,7 +4726,7 @@
               </a:tabLst>
             </a:pPr>
             <a:r>
-              <a:rPr lang="en-US" sz="3200" dirty="0" smtClean="0">
+              <a:rPr lang="en-US" sz="3200" dirty="0">
                 <a:solidFill>
                   <a:srgbClr val="FFFFFF"/>
                 </a:solidFill>
@@ -4857,13 +4755,6 @@
   <p:clrMapOvr>
     <a:masterClrMapping/>
   </p:clrMapOvr>
-  <p:timing>
-    <p:tnLst>
-      <p:par>
-        <p:cTn id="1" dur="indefinite" restart="never" nodeType="tmRoot"/>
-      </p:par>
-    </p:tnLst>
-  </p:timing>
 </p:sld>
 </file>
 
@@ -4914,7 +4805,7 @@
               </a:tabLst>
             </a:pPr>
             <a:r>
-              <a:rPr lang="en-US" sz="3200" dirty="0" smtClean="0">
+              <a:rPr lang="en-US" sz="3200" dirty="0">
                 <a:solidFill>
                   <a:srgbClr val="FFFFFF"/>
                 </a:solidFill>
@@ -5082,22 +4973,17 @@
           </a:lstStyle>
           <a:p>
             <a:r>
-              <a:rPr lang="en-US" dirty="0" smtClean="0"/>
+              <a:rPr lang="en-US" dirty="0"/>
               <a:t>Don’t return </a:t>
             </a:r>
             <a:r>
-              <a:rPr lang="en-US" dirty="0" smtClean="0">
+              <a:rPr lang="en-US" dirty="0">
                 <a:solidFill>
                   <a:srgbClr val="FF0000"/>
                 </a:solidFill>
               </a:rPr>
               <a:t>NULL</a:t>
             </a:r>
-            <a:endParaRPr lang="en-US" dirty="0" smtClean="0">
-              <a:solidFill>
-                <a:srgbClr val="FF0000"/>
-              </a:solidFill>
-            </a:endParaRPr>
           </a:p>
         </p:txBody>
       </p:sp>
@@ -5135,13 +5021,6 @@
   <p:clrMapOvr>
     <a:masterClrMapping/>
   </p:clrMapOvr>
-  <p:timing>
-    <p:tnLst>
-      <p:par>
-        <p:cTn id="1" dur="indefinite" restart="never" nodeType="tmRoot"/>
-      </p:par>
-    </p:tnLst>
-  </p:timing>
 </p:sld>
 </file>
 
@@ -5192,7 +5071,7 @@
               </a:tabLst>
             </a:pPr>
             <a:r>
-              <a:rPr lang="en-US" sz="3200" dirty="0" smtClean="0">
+              <a:rPr lang="en-US" sz="3200" dirty="0">
                 <a:solidFill>
                   <a:srgbClr val="FFFFFF"/>
                 </a:solidFill>
@@ -5238,7 +5117,7 @@
               </a:tabLst>
             </a:pPr>
             <a:r>
-              <a:rPr lang="en-US" sz="3200" dirty="0" smtClean="0">
+              <a:rPr lang="en-US" sz="3200" dirty="0">
                 <a:solidFill>
                   <a:srgbClr val="FFFFFF"/>
                 </a:solidFill>
@@ -5279,7 +5158,7 @@
               </a:tabLst>
             </a:pPr>
             <a:r>
-              <a:rPr lang="en-US" sz="3200" dirty="0" smtClean="0">
+              <a:rPr lang="en-US" sz="3200" dirty="0">
                 <a:solidFill>
                   <a:srgbClr val="FFFFFF"/>
                 </a:solidFill>
@@ -5320,7 +5199,7 @@
               </a:tabLst>
             </a:pPr>
             <a:r>
-              <a:rPr lang="en-US" sz="3200" dirty="0" smtClean="0">
+              <a:rPr lang="en-US" sz="3200" dirty="0">
                 <a:solidFill>
                   <a:srgbClr val="FFFFFF"/>
                 </a:solidFill>
@@ -5361,7 +5240,7 @@
               </a:tabLst>
             </a:pPr>
             <a:r>
-              <a:rPr lang="en-US" sz="3200" dirty="0" smtClean="0">
+              <a:rPr lang="en-US" sz="3200" dirty="0">
                 <a:solidFill>
                   <a:srgbClr val="FFFFFF"/>
                 </a:solidFill>
@@ -5380,7 +5259,7 @@
                 <a:tab pos="241300" algn="l"/>
               </a:tabLst>
             </a:pPr>
-            <a:endParaRPr lang="en-US" sz="3200" dirty="0" smtClean="0">
+            <a:endParaRPr lang="en-US" sz="3200" dirty="0">
               <a:solidFill>
                 <a:srgbClr val="FFFFFF"/>
               </a:solidFill>
@@ -5407,25 +5286,8 @@
                 <a:latin typeface="Century Gothic"/>
                 <a:cs typeface="Century Gothic"/>
               </a:rPr>
-              <a:t>Don’t Overcomplicate </a:t>
-            </a:r>
-            <a:r>
-              <a:rPr lang="en-US" sz="3200" dirty="0" smtClean="0">
-                <a:solidFill>
-                  <a:srgbClr val="FFFFFF"/>
-                </a:solidFill>
-                <a:latin typeface="Century Gothic"/>
-                <a:cs typeface="Century Gothic"/>
-              </a:rPr>
-              <a:t>Things</a:t>
-            </a:r>
-            <a:endParaRPr lang="en-US" sz="3200" dirty="0">
-              <a:solidFill>
-                <a:srgbClr val="FFFFFF"/>
-              </a:solidFill>
-              <a:latin typeface="Century Gothic"/>
-              <a:cs typeface="Century Gothic"/>
-            </a:endParaRPr>
+              <a:t>Don’t Overcomplicate Things</a:t>
+            </a:r>
           </a:p>
         </p:txBody>
       </p:sp>
@@ -5464,22 +5326,17 @@
           </a:lstStyle>
           <a:p>
             <a:r>
-              <a:rPr lang="en-US" dirty="0" smtClean="0"/>
+              <a:rPr lang="en-US" dirty="0"/>
               <a:t>Don’t return </a:t>
             </a:r>
             <a:r>
-              <a:rPr lang="en-US" dirty="0" smtClean="0">
+              <a:rPr lang="en-US" dirty="0">
                 <a:solidFill>
                   <a:srgbClr val="FF0000"/>
                 </a:solidFill>
               </a:rPr>
               <a:t>NULL</a:t>
             </a:r>
-            <a:endParaRPr lang="en-US" dirty="0" smtClean="0">
-              <a:solidFill>
-                <a:srgbClr val="FF0000"/>
-              </a:solidFill>
-            </a:endParaRPr>
           </a:p>
         </p:txBody>
       </p:sp>
@@ -5493,13 +5350,6 @@
   <p:clrMapOvr>
     <a:masterClrMapping/>
   </p:clrMapOvr>
-  <p:timing>
-    <p:tnLst>
-      <p:par>
-        <p:cTn id="1" dur="indefinite" restart="never" nodeType="tmRoot"/>
-      </p:par>
-    </p:tnLst>
-  </p:timing>
 </p:sld>
 </file>
 
@@ -5559,18 +5409,8 @@
               </a:rPr>
               <a:t>What happens when someone passes null as </a:t>
             </a:r>
-            <a:r>
-              <a:rPr lang="en-US" sz="3200" dirty="0" smtClean="0">
-                <a:solidFill>
-                  <a:srgbClr val="FFFFFF"/>
-                </a:solidFill>
-                <a:latin typeface="Century Gothic"/>
-                <a:cs typeface="Century Gothic"/>
-              </a:rPr>
-              <a:t/>
-            </a:r>
             <a:br>
-              <a:rPr lang="en-US" sz="3200" dirty="0" smtClean="0">
+              <a:rPr lang="en-US" sz="3200" dirty="0">
                 <a:solidFill>
                   <a:srgbClr val="FFFFFF"/>
                 </a:solidFill>
@@ -5579,34 +5419,14 @@
               </a:rPr>
             </a:br>
             <a:r>
-              <a:rPr lang="en-US" sz="3200" dirty="0" smtClean="0">
+              <a:rPr lang="en-US" sz="3200" dirty="0">
                 <a:solidFill>
                   <a:srgbClr val="FFFFFF"/>
                 </a:solidFill>
                 <a:latin typeface="Century Gothic"/>
                 <a:cs typeface="Century Gothic"/>
               </a:rPr>
-              <a:t>an </a:t>
-            </a:r>
-            <a:r>
-              <a:rPr lang="en-US" sz="3200" dirty="0">
-                <a:solidFill>
-                  <a:srgbClr val="FFFFFF"/>
-                </a:solidFill>
-                <a:latin typeface="Century Gothic"/>
-                <a:cs typeface="Century Gothic"/>
-              </a:rPr>
-              <a:t>argument</a:t>
-            </a:r>
-            <a:r>
-              <a:rPr lang="en-US" sz="3200" dirty="0" smtClean="0">
-                <a:solidFill>
-                  <a:srgbClr val="FFFFFF"/>
-                </a:solidFill>
-                <a:latin typeface="Century Gothic"/>
-                <a:cs typeface="Century Gothic"/>
-              </a:rPr>
-              <a:t>?</a:t>
+              <a:t>an argument?</a:t>
             </a:r>
             <a:endParaRPr lang="en-US" sz="3200" dirty="0">
               <a:solidFill>
@@ -5653,22 +5473,17 @@
           </a:lstStyle>
           <a:p>
             <a:r>
-              <a:rPr lang="en-US" dirty="0" smtClean="0"/>
+              <a:rPr lang="en-US" dirty="0"/>
               <a:t>Don’t pass </a:t>
             </a:r>
             <a:r>
-              <a:rPr lang="en-US" dirty="0" smtClean="0">
+              <a:rPr lang="en-US" dirty="0">
                 <a:solidFill>
                   <a:srgbClr val="FF0000"/>
                 </a:solidFill>
               </a:rPr>
               <a:t>NULL</a:t>
             </a:r>
-            <a:endParaRPr lang="en-US" dirty="0" smtClean="0">
-              <a:solidFill>
-                <a:srgbClr val="FF0000"/>
-              </a:solidFill>
-            </a:endParaRPr>
           </a:p>
         </p:txBody>
       </p:sp>
@@ -5706,13 +5521,6 @@
   <p:clrMapOvr>
     <a:masterClrMapping/>
   </p:clrMapOvr>
-  <p:timing>
-    <p:tnLst>
-      <p:par>
-        <p:cTn id="1" dur="indefinite" restart="never" nodeType="tmRoot"/>
-      </p:par>
-    </p:tnLst>
-  </p:timing>
 </p:sld>
 </file>
 
@@ -5763,7 +5571,7 @@
               </a:tabLst>
             </a:pPr>
             <a:r>
-              <a:rPr lang="en-US" sz="3200" dirty="0" smtClean="0">
+              <a:rPr lang="en-US" sz="3200" dirty="0">
                 <a:solidFill>
                   <a:srgbClr val="FFFFFF"/>
                 </a:solidFill>
@@ -5817,22 +5625,17 @@
           </a:lstStyle>
           <a:p>
             <a:r>
-              <a:rPr lang="en-US" dirty="0" smtClean="0"/>
+              <a:rPr lang="en-US" dirty="0"/>
               <a:t>Don’t pass </a:t>
             </a:r>
             <a:r>
-              <a:rPr lang="en-US" dirty="0" smtClean="0">
+              <a:rPr lang="en-US" dirty="0">
                 <a:solidFill>
                   <a:srgbClr val="FF0000"/>
                 </a:solidFill>
               </a:rPr>
               <a:t>NULL</a:t>
             </a:r>
-            <a:endParaRPr lang="en-US" dirty="0" smtClean="0">
-              <a:solidFill>
-                <a:srgbClr val="FF0000"/>
-              </a:solidFill>
-            </a:endParaRPr>
           </a:p>
         </p:txBody>
       </p:sp>
@@ -5894,13 +5697,6 @@
   <p:clrMapOvr>
     <a:masterClrMapping/>
   </p:clrMapOvr>
-  <p:timing>
-    <p:tnLst>
-      <p:par>
-        <p:cTn id="1" dur="indefinite" restart="never" nodeType="tmRoot"/>
-      </p:par>
-    </p:tnLst>
-  </p:timing>
 </p:sld>
 </file>
 
@@ -5952,7 +5748,7 @@
               </a:lnSpc>
             </a:pPr>
             <a:r>
-              <a:rPr lang="en-US" spc="-5" dirty="0" smtClean="0">
+              <a:rPr lang="en-US" spc="-5" dirty="0">
                 <a:solidFill>
                   <a:srgbClr val="00B0F0"/>
                 </a:solidFill>
@@ -5960,7 +5756,7 @@
               <a:t>Vocabulary</a:t>
             </a:r>
             <a:r>
-              <a:rPr lang="en-US" spc="-5" dirty="0" smtClean="0"/>
+              <a:rPr lang="en-US" spc="-5" dirty="0"/>
               <a:t>: Regression </a:t>
             </a:r>
             <a:endParaRPr spc="-5" dirty="0">
@@ -6000,7 +5796,7 @@
               </a:tabLst>
             </a:pPr>
             <a:r>
-              <a:rPr lang="en-US" sz="3200" dirty="0" smtClean="0">
+              <a:rPr lang="en-US" sz="3200" dirty="0">
                 <a:solidFill>
                   <a:srgbClr val="FFFFFF"/>
                 </a:solidFill>
@@ -6010,7 +5806,7 @@
               <a:t>A kind of bug which occurs </a:t>
             </a:r>
             <a:br>
-              <a:rPr lang="en-US" sz="3200" dirty="0" smtClean="0">
+              <a:rPr lang="en-US" sz="3200" dirty="0">
                 <a:solidFill>
                   <a:srgbClr val="FFFFFF"/>
                 </a:solidFill>
@@ -6019,7 +5815,7 @@
               </a:rPr>
             </a:br>
             <a:r>
-              <a:rPr lang="en-US" sz="3200" dirty="0" smtClean="0">
+              <a:rPr lang="en-US" sz="3200" dirty="0">
                 <a:solidFill>
                   <a:srgbClr val="FFFFFF"/>
                 </a:solidFill>
@@ -6056,7 +5852,7 @@
               </a:tabLst>
             </a:pPr>
             <a:r>
-              <a:rPr lang="en-US" sz="3200" dirty="0" smtClean="0">
+              <a:rPr lang="en-US" sz="3200" dirty="0">
                 <a:solidFill>
                   <a:srgbClr val="FFFFFF"/>
                 </a:solidFill>
@@ -6076,7 +5872,7 @@
               </a:tabLst>
             </a:pPr>
             <a:r>
-              <a:rPr lang="en-US" sz="3200" dirty="0" smtClean="0">
+              <a:rPr lang="en-US" sz="3200" dirty="0">
                 <a:solidFill>
                   <a:srgbClr val="FFFFFF"/>
                 </a:solidFill>
@@ -6085,7 +5881,7 @@
               </a:rPr>
               <a:t>or new bugs created from changes</a:t>
             </a:r>
-            <a:endParaRPr lang="en-US" sz="3200" dirty="0" smtClean="0">
+            <a:endParaRPr lang="en-US" sz="3200" dirty="0">
               <a:solidFill>
                 <a:schemeClr val="bg1"/>
               </a:solidFill>
@@ -6135,13 +5931,6 @@
   <p:clrMapOvr>
     <a:masterClrMapping/>
   </p:clrMapOvr>
-  <p:timing>
-    <p:tnLst>
-      <p:par>
-        <p:cTn id="1" dur="indefinite" restart="never" nodeType="tmRoot"/>
-      </p:par>
-    </p:tnLst>
-  </p:timing>
 </p:sld>
 </file>
 
@@ -6194,7 +5983,7 @@
               </a:tabLst>
             </a:pPr>
             <a:r>
-              <a:rPr lang="en-US" sz="3200" dirty="0" smtClean="0">
+              <a:rPr lang="en-US" sz="3200" dirty="0">
                 <a:solidFill>
                   <a:srgbClr val="FFFFFF"/>
                 </a:solidFill>
@@ -6242,7 +6031,7 @@
               </a:tabLst>
             </a:pPr>
             <a:r>
-              <a:rPr lang="en-US" sz="3200" dirty="0" smtClean="0">
+              <a:rPr lang="en-US" sz="3200" dirty="0">
                 <a:solidFill>
                   <a:srgbClr val="FFFFFF"/>
                 </a:solidFill>
@@ -6283,7 +6072,7 @@
               </a:tabLst>
             </a:pPr>
             <a:r>
-              <a:rPr lang="en-US" sz="3200" dirty="0" smtClean="0">
+              <a:rPr lang="en-US" sz="3200" dirty="0">
                 <a:solidFill>
                   <a:srgbClr val="FFFFFF"/>
                 </a:solidFill>
@@ -6324,7 +6113,7 @@
               </a:tabLst>
             </a:pPr>
             <a:r>
-              <a:rPr lang="en-US" sz="3200" dirty="0" smtClean="0">
+              <a:rPr lang="en-US" sz="3200" dirty="0">
                 <a:solidFill>
                   <a:srgbClr val="FFFFFF"/>
                 </a:solidFill>
@@ -6371,7 +6160,7 @@
           </a:lstStyle>
           <a:p>
             <a:r>
-              <a:rPr lang="en-US" dirty="0" smtClean="0"/>
+              <a:rPr lang="en-US" dirty="0"/>
               <a:t>Error types</a:t>
             </a:r>
           </a:p>
@@ -6387,13 +6176,6 @@
   <p:clrMapOvr>
     <a:masterClrMapping/>
   </p:clrMapOvr>
-  <p:timing>
-    <p:tnLst>
-      <p:par>
-        <p:cTn id="1" dur="indefinite" restart="never" nodeType="tmRoot"/>
-      </p:par>
-    </p:tnLst>
-  </p:timing>
 </p:sld>
 </file>
 
@@ -6445,7 +6227,7 @@
               </a:lnSpc>
             </a:pPr>
             <a:r>
-              <a:rPr lang="en-US" spc="-5" dirty="0" smtClean="0">
+              <a:rPr lang="en-US" spc="-5" dirty="0">
                 <a:solidFill>
                   <a:srgbClr val="00B0F0"/>
                 </a:solidFill>
@@ -6453,7 +6235,7 @@
               <a:t>Tool</a:t>
             </a:r>
             <a:r>
-              <a:rPr lang="en-US" spc="-5" dirty="0" smtClean="0"/>
+              <a:rPr lang="en-US" spc="-5" dirty="0"/>
               <a:t>: Issue tracker</a:t>
             </a:r>
             <a:endParaRPr spc="-5" dirty="0">
@@ -6471,8 +6253,8 @@
         </p:nvSpPr>
         <p:spPr>
           <a:xfrm>
-            <a:off x="892986" y="2367695"/>
-            <a:ext cx="10534219" cy="3939540"/>
+            <a:off x="892986" y="2057400"/>
+            <a:ext cx="10534219" cy="4431983"/>
           </a:xfrm>
           <a:prstGeom prst="rect">
             <a:avLst/>
@@ -6500,17 +6282,7 @@
                 <a:latin typeface="Century Gothic"/>
                 <a:cs typeface="Century Gothic"/>
               </a:rPr>
-              <a:t>Issue tracking is the process of recording customer complaints and problems so that they can be resolved in an organized fashion</a:t>
-            </a:r>
-            <a:r>
-              <a:rPr lang="en-US" sz="3200" dirty="0" smtClean="0">
-                <a:solidFill>
-                  <a:srgbClr val="FFFFFF"/>
-                </a:solidFill>
-                <a:latin typeface="Century Gothic"/>
-                <a:cs typeface="Century Gothic"/>
-              </a:rPr>
-              <a:t>.</a:t>
+              <a:t>Issue tracking is the process of recording customer complaints and problems so that they can be resolved in an organized fashion.</a:t>
             </a:r>
           </a:p>
           <a:p>
@@ -6542,7 +6314,7 @@
               </a:tabLst>
             </a:pPr>
             <a:r>
-              <a:rPr lang="en-US" sz="3200" dirty="0" smtClean="0">
+              <a:rPr lang="en-US" sz="3200" dirty="0">
                 <a:solidFill>
                   <a:srgbClr val="FFFFFF"/>
                 </a:solidFill>
@@ -6564,7 +6336,7 @@
               </a:tabLst>
             </a:pPr>
             <a:r>
-              <a:rPr lang="en-US" sz="3200" dirty="0" smtClean="0">
+              <a:rPr lang="en-US" sz="3200" dirty="0">
                 <a:solidFill>
                   <a:srgbClr val="FFFFFF"/>
                 </a:solidFill>
@@ -6586,7 +6358,7 @@
               </a:tabLst>
             </a:pPr>
             <a:r>
-              <a:rPr lang="en-US" sz="3200" dirty="0" smtClean="0">
+              <a:rPr lang="en-US" sz="3200" dirty="0">
                 <a:solidFill>
                   <a:srgbClr val="FFFFFF"/>
                 </a:solidFill>
@@ -6608,7 +6380,29 @@
               </a:tabLst>
             </a:pPr>
             <a:r>
-              <a:rPr lang="en-US" sz="3200" dirty="0" smtClean="0">
+              <a:rPr lang="en-US" sz="3200" dirty="0">
+                <a:solidFill>
+                  <a:srgbClr val="FFFFFF"/>
+                </a:solidFill>
+                <a:latin typeface="Century Gothic"/>
+                <a:cs typeface="Century Gothic"/>
+              </a:rPr>
+              <a:t>Proposal</a:t>
+            </a:r>
+          </a:p>
+          <a:p>
+            <a:pPr marL="469900" indent="-457200">
+              <a:lnSpc>
+                <a:spcPct val="100000"/>
+              </a:lnSpc>
+              <a:buFont typeface="Arial" panose="020B0604020202020204" pitchFamily="34" charset="0"/>
+              <a:buChar char="•"/>
+              <a:tabLst>
+                <a:tab pos="241300" algn="l"/>
+              </a:tabLst>
+            </a:pPr>
+            <a:r>
+              <a:rPr lang="en-US" sz="3200" dirty="0">
                 <a:solidFill>
                   <a:srgbClr val="FFFFFF"/>
                 </a:solidFill>
@@ -6637,13 +6431,6 @@
   <p:clrMapOvr>
     <a:masterClrMapping/>
   </p:clrMapOvr>
-  <p:timing>
-    <p:tnLst>
-      <p:par>
-        <p:cTn id="1" dur="indefinite" restart="never" nodeType="tmRoot"/>
-      </p:par>
-    </p:tnLst>
-  </p:timing>
 </p:sld>
 </file>
 
@@ -6730,13 +6517,6 @@
   <p:clrMapOvr>
     <a:masterClrMapping/>
   </p:clrMapOvr>
-  <p:timing>
-    <p:tnLst>
-      <p:par>
-        <p:cTn id="1" dur="indefinite" restart="never" nodeType="tmRoot"/>
-      </p:par>
-    </p:tnLst>
-  </p:timing>
 </p:sld>
 </file>
 
@@ -6807,13 +6587,8 @@
           <a:p>
             <a:r>
               <a:rPr lang="en-US" dirty="0"/>
-              <a:t>Use Exceptions Rather Than Return </a:t>
-            </a:r>
-            <a:r>
-              <a:rPr lang="en-US" dirty="0" smtClean="0"/>
-              <a:t>Codes</a:t>
-            </a:r>
-            <a:endParaRPr lang="en-US" dirty="0"/>
+              <a:t>Use Exceptions Rather Than Return Codes</a:t>
+            </a:r>
           </a:p>
         </p:txBody>
       </p:sp>
@@ -6851,13 +6626,6 @@
   <p:clrMapOvr>
     <a:masterClrMapping/>
   </p:clrMapOvr>
-  <p:timing>
-    <p:tnLst>
-      <p:par>
-        <p:cTn id="1" dur="indefinite" restart="never" nodeType="tmRoot"/>
-      </p:par>
-    </p:tnLst>
-  </p:timing>
 </p:sld>
 </file>
 
@@ -6928,13 +6696,8 @@
           <a:p>
             <a:r>
               <a:rPr lang="en-US" dirty="0"/>
-              <a:t>Use Exceptions Rather Than Return </a:t>
-            </a:r>
-            <a:r>
-              <a:rPr lang="en-US" dirty="0" smtClean="0"/>
-              <a:t>Codes</a:t>
-            </a:r>
-            <a:endParaRPr lang="en-US" dirty="0"/>
+              <a:t>Use Exceptions Rather Than Return Codes</a:t>
+            </a:r>
           </a:p>
         </p:txBody>
       </p:sp>
@@ -6972,13 +6735,6 @@
   <p:clrMapOvr>
     <a:masterClrMapping/>
   </p:clrMapOvr>
-  <p:timing>
-    <p:tnLst>
-      <p:par>
-        <p:cTn id="1" dur="indefinite" restart="never" nodeType="tmRoot"/>
-      </p:par>
-    </p:tnLst>
-  </p:timing>
 </p:sld>
 </file>
 
@@ -7049,13 +6805,8 @@
           <a:p>
             <a:r>
               <a:rPr lang="en-US" dirty="0"/>
-              <a:t>Use Exceptions Rather Than Return </a:t>
-            </a:r>
-            <a:r>
-              <a:rPr lang="en-US" dirty="0" smtClean="0"/>
-              <a:t>Codes</a:t>
-            </a:r>
-            <a:endParaRPr lang="en-US" dirty="0"/>
+              <a:t>Use Exceptions Rather Than Return Codes</a:t>
+            </a:r>
           </a:p>
         </p:txBody>
       </p:sp>
@@ -7093,13 +6844,6 @@
   <p:clrMapOvr>
     <a:masterClrMapping/>
   </p:clrMapOvr>
-  <p:timing>
-    <p:tnLst>
-      <p:par>
-        <p:cTn id="1" dur="indefinite" restart="never" nodeType="tmRoot"/>
-      </p:par>
-    </p:tnLst>
-  </p:timing>
 </p:sld>
 </file>
 
@@ -7152,7 +6896,7 @@
               </a:tabLst>
             </a:pPr>
             <a:r>
-              <a:rPr lang="en-US" sz="3200" dirty="0" smtClean="0">
+              <a:rPr lang="en-US" sz="3200" dirty="0">
                 <a:solidFill>
                   <a:srgbClr val="FFFF00"/>
                 </a:solidFill>
@@ -7162,7 +6906,7 @@
               <a:t>Try</a:t>
             </a:r>
             <a:r>
-              <a:rPr lang="en-US" sz="3200" dirty="0" smtClean="0">
+              <a:rPr lang="en-US" sz="3200" dirty="0">
                 <a:solidFill>
                   <a:srgbClr val="FFFFFF"/>
                 </a:solidFill>
@@ -7230,40 +6974,10 @@
                 <a:latin typeface="Century Gothic"/>
                 <a:cs typeface="Century Gothic"/>
               </a:rPr>
-              <a:t> has to leave your program in </a:t>
-            </a:r>
-            <a:r>
-              <a:rPr lang="en-US" sz="3200" dirty="0" smtClean="0">
-                <a:solidFill>
-                  <a:srgbClr val="FFFFFF"/>
-                </a:solidFill>
-                <a:latin typeface="Century Gothic"/>
-                <a:cs typeface="Century Gothic"/>
-              </a:rPr>
-              <a:t>consistent </a:t>
+              <a:t> has to leave your program in consistent state, no matter what happens in the </a:t>
             </a:r>
             <a:r>
               <a:rPr lang="en-US" sz="3200" dirty="0">
-                <a:solidFill>
-                  <a:srgbClr val="FFFFFF"/>
-                </a:solidFill>
-                <a:latin typeface="Century Gothic"/>
-                <a:cs typeface="Century Gothic"/>
-              </a:rPr>
-              <a:t>state</a:t>
-            </a:r>
-            <a:r>
-              <a:rPr lang="en-US" sz="3200" dirty="0" smtClean="0">
-                <a:solidFill>
-                  <a:srgbClr val="FFFFFF"/>
-                </a:solidFill>
-                <a:latin typeface="Century Gothic"/>
-                <a:cs typeface="Century Gothic"/>
-              </a:rPr>
-              <a:t>, no matter what happens in the </a:t>
-            </a:r>
-            <a:r>
-              <a:rPr lang="en-US" sz="3200" dirty="0" smtClean="0">
                 <a:solidFill>
                   <a:srgbClr val="FFFF00"/>
                 </a:solidFill>
@@ -7310,10 +7024,9 @@
           </a:lstStyle>
           <a:p>
             <a:r>
-              <a:rPr lang="en-US" dirty="0" smtClean="0"/>
+              <a:rPr lang="en-US" dirty="0"/>
               <a:t>Try-Catch-Finally Statement</a:t>
             </a:r>
-            <a:endParaRPr lang="en-US" dirty="0" smtClean="0"/>
           </a:p>
         </p:txBody>
       </p:sp>
@@ -7351,13 +7064,6 @@
   <p:clrMapOvr>
     <a:masterClrMapping/>
   </p:clrMapOvr>
-  <p:timing>
-    <p:tnLst>
-      <p:par>
-        <p:cTn id="1" dur="indefinite" restart="never" nodeType="tmRoot"/>
-      </p:par>
-    </p:tnLst>
-  </p:timing>
 </p:sld>
 </file>
 
@@ -7408,7 +7114,7 @@
               </a:tabLst>
             </a:pPr>
             <a:r>
-              <a:rPr lang="en-US" sz="3200" dirty="0" smtClean="0">
+              <a:rPr lang="en-US" sz="3200" dirty="0">
                 <a:solidFill>
                   <a:srgbClr val="FFFFFF"/>
                 </a:solidFill>
@@ -7427,7 +7133,7 @@
                 <a:tab pos="241300" algn="l"/>
               </a:tabLst>
             </a:pPr>
-            <a:endParaRPr lang="en-US" sz="3200" dirty="0" smtClean="0">
+            <a:endParaRPr lang="en-US" sz="3200" dirty="0">
               <a:solidFill>
                 <a:srgbClr val="FFFFFF"/>
               </a:solidFill>
@@ -7445,24 +7151,14 @@
               </a:tabLst>
             </a:pPr>
             <a:r>
-              <a:rPr lang="en-US" sz="3200" dirty="0" smtClean="0">
+              <a:rPr lang="en-US" sz="3200" dirty="0">
                 <a:solidFill>
                   <a:srgbClr val="FFFFFF"/>
                 </a:solidFill>
                 <a:latin typeface="Century Gothic"/>
                 <a:cs typeface="Century Gothic"/>
               </a:rPr>
-              <a:t>Checked exception is a type of exception which force the caller to write try/catch block, otherwise we would have compiler error</a:t>
-            </a:r>
-            <a:r>
-              <a:rPr lang="en-US" sz="3200" dirty="0" smtClean="0">
-                <a:solidFill>
-                  <a:srgbClr val="FFFFFF"/>
-                </a:solidFill>
-                <a:latin typeface="Century Gothic"/>
-                <a:cs typeface="Century Gothic"/>
-              </a:rPr>
-              <a:t>.</a:t>
+              <a:t>Checked exception is a type of exception which force the caller to write try/catch block, otherwise we would have compiler error.</a:t>
             </a:r>
           </a:p>
           <a:p>
@@ -7492,7 +7188,7 @@
               </a:tabLst>
             </a:pPr>
             <a:r>
-              <a:rPr lang="en-US" sz="3200" dirty="0" smtClean="0">
+              <a:rPr lang="en-US" sz="3200" dirty="0">
                 <a:solidFill>
                   <a:srgbClr val="FFFFFF"/>
                 </a:solidFill>
@@ -7545,13 +7241,6 @@
               </a:rPr>
               <a:t>Break encapsulation</a:t>
             </a:r>
-            <a:endParaRPr lang="en-US" sz="3200" dirty="0">
-              <a:solidFill>
-                <a:srgbClr val="FFFFFF"/>
-              </a:solidFill>
-              <a:latin typeface="Century Gothic"/>
-              <a:cs typeface="Century Gothic"/>
-            </a:endParaRPr>
           </a:p>
         </p:txBody>
       </p:sp>
@@ -7593,7 +7282,6 @@
               <a:rPr lang="en-US" dirty="0"/>
               <a:t>Use Unchecked Exceptions</a:t>
             </a:r>
-            <a:endParaRPr lang="en-US" dirty="0" smtClean="0"/>
           </a:p>
         </p:txBody>
       </p:sp>
@@ -7607,13 +7295,6 @@
   <p:clrMapOvr>
     <a:masterClrMapping/>
   </p:clrMapOvr>
-  <p:timing>
-    <p:tnLst>
-      <p:par>
-        <p:cTn id="1" dur="indefinite" restart="never" nodeType="tmRoot"/>
-      </p:par>
-    </p:tnLst>
-  </p:timing>
 </p:sld>
 </file>
 
@@ -7672,7 +7353,6 @@
               <a:rPr lang="en-US" dirty="0"/>
               <a:t>Use Unchecked Exceptions</a:t>
             </a:r>
-            <a:endParaRPr lang="en-US" dirty="0" smtClean="0"/>
           </a:p>
         </p:txBody>
       </p:sp>
@@ -7716,13 +7396,6 @@
   <p:clrMapOvr>
     <a:masterClrMapping/>
   </p:clrMapOvr>
-  <p:timing>
-    <p:tnLst>
-      <p:par>
-        <p:cTn id="1" dur="indefinite" restart="never" nodeType="tmRoot"/>
-      </p:par>
-    </p:tnLst>
-  </p:timing>
 </p:sld>
 </file>
 
@@ -7791,7 +7464,7 @@
                 <a:tab pos="241300" algn="l"/>
               </a:tabLst>
             </a:pPr>
-            <a:endParaRPr lang="en-US" sz="3200" dirty="0" smtClean="0">
+            <a:endParaRPr lang="en-US" sz="3200" dirty="0">
               <a:solidFill>
                 <a:srgbClr val="FFFFFF"/>
               </a:solidFill>
@@ -7811,7 +7484,7 @@
               </a:tabLst>
             </a:pPr>
             <a:r>
-              <a:rPr lang="en-US" sz="3200" dirty="0" smtClean="0">
+              <a:rPr lang="en-US" sz="3200" dirty="0">
                 <a:solidFill>
                   <a:srgbClr val="FFFFFF"/>
                 </a:solidFill>
@@ -7864,27 +7537,7 @@
                 <a:latin typeface="Century Gothic"/>
                 <a:cs typeface="Century Gothic"/>
               </a:rPr>
-              <a:t>Mention the </a:t>
-            </a:r>
-            <a:r>
-              <a:rPr lang="en-US" sz="3200" dirty="0">
-                <a:solidFill>
-                  <a:srgbClr val="FFFFFF"/>
-                </a:solidFill>
-                <a:latin typeface="Century Gothic"/>
-                <a:cs typeface="Century Gothic"/>
-              </a:rPr>
-              <a:t>operation that failed and the type of </a:t>
-            </a:r>
-            <a:r>
-              <a:rPr lang="en-US" sz="3200" dirty="0">
-                <a:solidFill>
-                  <a:srgbClr val="FFFFFF"/>
-                </a:solidFill>
-                <a:latin typeface="Century Gothic"/>
-                <a:cs typeface="Century Gothic"/>
-              </a:rPr>
-              <a:t>failure</a:t>
+              <a:t>Mention the operation that failed and the type of failure</a:t>
             </a:r>
           </a:p>
           <a:p>
@@ -7927,13 +7580,6 @@
               </a:rPr>
               <a:t>Give user of your code a solution</a:t>
             </a:r>
-            <a:endParaRPr lang="en-US" sz="3200" dirty="0">
-              <a:solidFill>
-                <a:srgbClr val="FFFFFF"/>
-              </a:solidFill>
-              <a:latin typeface="Century Gothic"/>
-              <a:cs typeface="Century Gothic"/>
-            </a:endParaRPr>
           </a:p>
         </p:txBody>
       </p:sp>
@@ -7975,7 +7621,6 @@
               <a:rPr lang="en-US" dirty="0"/>
               <a:t>Provide Context with Exceptions</a:t>
             </a:r>
-            <a:endParaRPr lang="en-US" dirty="0" smtClean="0"/>
           </a:p>
         </p:txBody>
       </p:sp>
@@ -7989,13 +7634,6 @@
   <p:clrMapOvr>
     <a:masterClrMapping/>
   </p:clrMapOvr>
-  <p:timing>
-    <p:tnLst>
-      <p:par>
-        <p:cTn id="1" dur="indefinite" restart="never" nodeType="tmRoot"/>
-      </p:par>
-    </p:tnLst>
-  </p:timing>
 </p:sld>
 </file>
 

</xml_diff>